<commit_message>
finished on initial palette post
</commit_message>
<xml_diff>
--- a/misc/colour-palette-design.pptx
+++ b/misc/colour-palette-design.pptx
@@ -6697,422 +6697,6 @@
       </p:sp>
       <p:sp>
         <p:nvSpPr>
-          <p:cNvPr id="66" name="Triangle 65">
-            <a:extLst>
-              <a:ext uri="{FF2B5EF4-FFF2-40B4-BE49-F238E27FC236}">
-                <a16:creationId xmlns:a16="http://schemas.microsoft.com/office/drawing/2014/main" id="{76339DA3-A233-0890-D3A5-E505BD2EA8D6}"/>
-              </a:ext>
-            </a:extLst>
-          </p:cNvPr>
-          <p:cNvSpPr/>
-          <p:nvPr/>
-        </p:nvSpPr>
-        <p:spPr>
-          <a:xfrm>
-            <a:off x="3596720" y="1857688"/>
-            <a:ext cx="332486" cy="286626"/>
-          </a:xfrm>
-          <a:prstGeom prst="triangle">
-            <a:avLst/>
-          </a:prstGeom>
-          <a:solidFill>
-            <a:srgbClr val="34DCDF"/>
-          </a:solidFill>
-          <a:ln>
-            <a:noFill/>
-          </a:ln>
-        </p:spPr>
-        <p:style>
-          <a:lnRef idx="2">
-            <a:schemeClr val="accent1">
-              <a:shade val="15000"/>
-            </a:schemeClr>
-          </a:lnRef>
-          <a:fillRef idx="1">
-            <a:schemeClr val="accent1"/>
-          </a:fillRef>
-          <a:effectRef idx="0">
-            <a:schemeClr val="accent1"/>
-          </a:effectRef>
-          <a:fontRef idx="minor">
-            <a:schemeClr val="lt1"/>
-          </a:fontRef>
-        </p:style>
-        <p:txBody>
-          <a:bodyPr rtlCol="0" anchor="ctr"/>
-          <a:lstStyle/>
-          <a:p>
-            <a:pPr algn="ctr"/>
-            <a:endParaRPr lang="en-GB"/>
-          </a:p>
-        </p:txBody>
-      </p:sp>
-      <p:sp>
-        <p:nvSpPr>
-          <p:cNvPr id="67" name="Triangle 66">
-            <a:extLst>
-              <a:ext uri="{FF2B5EF4-FFF2-40B4-BE49-F238E27FC236}">
-                <a16:creationId xmlns:a16="http://schemas.microsoft.com/office/drawing/2014/main" id="{22E43325-9A8A-D068-E6C1-93E6A3426297}"/>
-              </a:ext>
-            </a:extLst>
-          </p:cNvPr>
-          <p:cNvSpPr/>
-          <p:nvPr/>
-        </p:nvSpPr>
-        <p:spPr>
-          <a:xfrm>
-            <a:off x="5320291" y="851528"/>
-            <a:ext cx="332486" cy="286626"/>
-          </a:xfrm>
-          <a:prstGeom prst="triangle">
-            <a:avLst/>
-          </a:prstGeom>
-          <a:solidFill>
-            <a:srgbClr val="EDC938"/>
-          </a:solidFill>
-          <a:ln>
-            <a:noFill/>
-          </a:ln>
-        </p:spPr>
-        <p:style>
-          <a:lnRef idx="2">
-            <a:schemeClr val="accent1">
-              <a:shade val="15000"/>
-            </a:schemeClr>
-          </a:lnRef>
-          <a:fillRef idx="1">
-            <a:schemeClr val="accent1"/>
-          </a:fillRef>
-          <a:effectRef idx="0">
-            <a:schemeClr val="accent1"/>
-          </a:effectRef>
-          <a:fontRef idx="minor">
-            <a:schemeClr val="lt1"/>
-          </a:fontRef>
-        </p:style>
-        <p:txBody>
-          <a:bodyPr rtlCol="0" anchor="ctr"/>
-          <a:lstStyle/>
-          <a:p>
-            <a:pPr algn="ctr"/>
-            <a:endParaRPr lang="en-GB"/>
-          </a:p>
-        </p:txBody>
-      </p:sp>
-      <p:sp>
-        <p:nvSpPr>
-          <p:cNvPr id="78" name="Triangle 77">
-            <a:extLst>
-              <a:ext uri="{FF2B5EF4-FFF2-40B4-BE49-F238E27FC236}">
-                <a16:creationId xmlns:a16="http://schemas.microsoft.com/office/drawing/2014/main" id="{AE6BA4A3-CFFA-24A7-FC6C-A3070749E07E}"/>
-              </a:ext>
-            </a:extLst>
-          </p:cNvPr>
-          <p:cNvSpPr/>
-          <p:nvPr/>
-        </p:nvSpPr>
-        <p:spPr>
-          <a:xfrm>
-            <a:off x="3045729" y="3680668"/>
-            <a:ext cx="332486" cy="286626"/>
-          </a:xfrm>
-          <a:prstGeom prst="triangle">
-            <a:avLst/>
-          </a:prstGeom>
-          <a:solidFill>
-            <a:srgbClr val="E67B53"/>
-          </a:solidFill>
-          <a:ln>
-            <a:noFill/>
-          </a:ln>
-        </p:spPr>
-        <p:style>
-          <a:lnRef idx="2">
-            <a:schemeClr val="accent1">
-              <a:shade val="15000"/>
-            </a:schemeClr>
-          </a:lnRef>
-          <a:fillRef idx="1">
-            <a:schemeClr val="accent1"/>
-          </a:fillRef>
-          <a:effectRef idx="0">
-            <a:schemeClr val="accent1"/>
-          </a:effectRef>
-          <a:fontRef idx="minor">
-            <a:schemeClr val="lt1"/>
-          </a:fontRef>
-        </p:style>
-        <p:txBody>
-          <a:bodyPr rtlCol="0" anchor="ctr"/>
-          <a:lstStyle/>
-          <a:p>
-            <a:pPr algn="ctr"/>
-            <a:endParaRPr lang="en-GB"/>
-          </a:p>
-        </p:txBody>
-      </p:sp>
-      <p:sp>
-        <p:nvSpPr>
-          <p:cNvPr id="79" name="Triangle 78">
-            <a:extLst>
-              <a:ext uri="{FF2B5EF4-FFF2-40B4-BE49-F238E27FC236}">
-                <a16:creationId xmlns:a16="http://schemas.microsoft.com/office/drawing/2014/main" id="{4E94192B-58DB-ABCE-8B9F-23415DF834AD}"/>
-              </a:ext>
-            </a:extLst>
-          </p:cNvPr>
-          <p:cNvSpPr/>
-          <p:nvPr/>
-        </p:nvSpPr>
-        <p:spPr>
-          <a:xfrm>
-            <a:off x="5299676" y="2387456"/>
-            <a:ext cx="332486" cy="286626"/>
-          </a:xfrm>
-          <a:prstGeom prst="triangle">
-            <a:avLst/>
-          </a:prstGeom>
-          <a:solidFill>
-            <a:srgbClr val="F75774"/>
-          </a:solidFill>
-          <a:ln>
-            <a:noFill/>
-          </a:ln>
-        </p:spPr>
-        <p:style>
-          <a:lnRef idx="2">
-            <a:schemeClr val="accent1">
-              <a:shade val="15000"/>
-            </a:schemeClr>
-          </a:lnRef>
-          <a:fillRef idx="1">
-            <a:schemeClr val="accent1"/>
-          </a:fillRef>
-          <a:effectRef idx="0">
-            <a:schemeClr val="accent1"/>
-          </a:effectRef>
-          <a:fontRef idx="minor">
-            <a:schemeClr val="lt1"/>
-          </a:fontRef>
-        </p:style>
-        <p:txBody>
-          <a:bodyPr rtlCol="0" anchor="ctr"/>
-          <a:lstStyle/>
-          <a:p>
-            <a:pPr algn="ctr"/>
-            <a:endParaRPr lang="en-GB"/>
-          </a:p>
-        </p:txBody>
-      </p:sp>
-      <p:sp>
-        <p:nvSpPr>
-          <p:cNvPr id="80" name="Triangle 79">
-            <a:extLst>
-              <a:ext uri="{FF2B5EF4-FFF2-40B4-BE49-F238E27FC236}">
-                <a16:creationId xmlns:a16="http://schemas.microsoft.com/office/drawing/2014/main" id="{D24E10FA-56A5-B605-0628-057F1DEAF5C2}"/>
-              </a:ext>
-            </a:extLst>
-          </p:cNvPr>
-          <p:cNvSpPr/>
-          <p:nvPr/>
-        </p:nvSpPr>
-        <p:spPr>
-          <a:xfrm rot="10800000">
-            <a:off x="3091891" y="1878250"/>
-            <a:ext cx="332486" cy="286626"/>
-          </a:xfrm>
-          <a:prstGeom prst="triangle">
-            <a:avLst/>
-          </a:prstGeom>
-          <a:solidFill>
-            <a:srgbClr val="D8F893"/>
-          </a:solidFill>
-          <a:ln>
-            <a:noFill/>
-          </a:ln>
-        </p:spPr>
-        <p:style>
-          <a:lnRef idx="2">
-            <a:schemeClr val="accent1">
-              <a:shade val="15000"/>
-            </a:schemeClr>
-          </a:lnRef>
-          <a:fillRef idx="1">
-            <a:schemeClr val="accent1"/>
-          </a:fillRef>
-          <a:effectRef idx="0">
-            <a:schemeClr val="accent1"/>
-          </a:effectRef>
-          <a:fontRef idx="minor">
-            <a:schemeClr val="lt1"/>
-          </a:fontRef>
-        </p:style>
-        <p:txBody>
-          <a:bodyPr rtlCol="0" anchor="ctr"/>
-          <a:lstStyle/>
-          <a:p>
-            <a:pPr algn="ctr"/>
-            <a:endParaRPr lang="en-GB"/>
-          </a:p>
-        </p:txBody>
-      </p:sp>
-      <p:sp>
-        <p:nvSpPr>
-          <p:cNvPr id="81" name="Triangle 80">
-            <a:extLst>
-              <a:ext uri="{FF2B5EF4-FFF2-40B4-BE49-F238E27FC236}">
-                <a16:creationId xmlns:a16="http://schemas.microsoft.com/office/drawing/2014/main" id="{87B9C8EC-F4E6-546C-7386-AC692BED102E}"/>
-              </a:ext>
-            </a:extLst>
-          </p:cNvPr>
-          <p:cNvSpPr/>
-          <p:nvPr/>
-        </p:nvSpPr>
-        <p:spPr>
-          <a:xfrm rot="10800000">
-            <a:off x="6159385" y="939552"/>
-            <a:ext cx="332486" cy="286626"/>
-          </a:xfrm>
-          <a:prstGeom prst="triangle">
-            <a:avLst/>
-          </a:prstGeom>
-          <a:solidFill>
-            <a:srgbClr val="D8F893"/>
-          </a:solidFill>
-          <a:ln>
-            <a:noFill/>
-          </a:ln>
-        </p:spPr>
-        <p:style>
-          <a:lnRef idx="2">
-            <a:schemeClr val="accent1">
-              <a:shade val="15000"/>
-            </a:schemeClr>
-          </a:lnRef>
-          <a:fillRef idx="1">
-            <a:schemeClr val="accent1"/>
-          </a:fillRef>
-          <a:effectRef idx="0">
-            <a:schemeClr val="accent1"/>
-          </a:effectRef>
-          <a:fontRef idx="minor">
-            <a:schemeClr val="lt1"/>
-          </a:fontRef>
-        </p:style>
-        <p:txBody>
-          <a:bodyPr rtlCol="0" anchor="ctr"/>
-          <a:lstStyle/>
-          <a:p>
-            <a:pPr algn="ctr"/>
-            <a:endParaRPr lang="en-GB"/>
-          </a:p>
-        </p:txBody>
-      </p:sp>
-      <p:sp>
-        <p:nvSpPr>
-          <p:cNvPr id="82" name="Triangle 81">
-            <a:extLst>
-              <a:ext uri="{FF2B5EF4-FFF2-40B4-BE49-F238E27FC236}">
-                <a16:creationId xmlns:a16="http://schemas.microsoft.com/office/drawing/2014/main" id="{1DFD559E-6220-0ACA-82D5-0C17724FB379}"/>
-              </a:ext>
-            </a:extLst>
-          </p:cNvPr>
-          <p:cNvSpPr/>
-          <p:nvPr/>
-        </p:nvSpPr>
-        <p:spPr>
-          <a:xfrm rot="10800000">
-            <a:off x="4155084" y="2314043"/>
-            <a:ext cx="332486" cy="286626"/>
-          </a:xfrm>
-          <a:prstGeom prst="triangle">
-            <a:avLst/>
-          </a:prstGeom>
-          <a:solidFill>
-            <a:srgbClr val="D8F893"/>
-          </a:solidFill>
-          <a:ln>
-            <a:noFill/>
-          </a:ln>
-        </p:spPr>
-        <p:style>
-          <a:lnRef idx="2">
-            <a:schemeClr val="accent1">
-              <a:shade val="15000"/>
-            </a:schemeClr>
-          </a:lnRef>
-          <a:fillRef idx="1">
-            <a:schemeClr val="accent1"/>
-          </a:fillRef>
-          <a:effectRef idx="0">
-            <a:schemeClr val="accent1"/>
-          </a:effectRef>
-          <a:fontRef idx="minor">
-            <a:schemeClr val="lt1"/>
-          </a:fontRef>
-        </p:style>
-        <p:txBody>
-          <a:bodyPr rtlCol="0" anchor="ctr"/>
-          <a:lstStyle/>
-          <a:p>
-            <a:pPr algn="ctr"/>
-            <a:endParaRPr lang="en-GB"/>
-          </a:p>
-        </p:txBody>
-      </p:sp>
-      <p:sp>
-        <p:nvSpPr>
-          <p:cNvPr id="83" name="Triangle 82">
-            <a:extLst>
-              <a:ext uri="{FF2B5EF4-FFF2-40B4-BE49-F238E27FC236}">
-                <a16:creationId xmlns:a16="http://schemas.microsoft.com/office/drawing/2014/main" id="{FD7FC1C8-F695-A583-B17D-CA468B8C0800}"/>
-              </a:ext>
-            </a:extLst>
-          </p:cNvPr>
-          <p:cNvSpPr/>
-          <p:nvPr/>
-        </p:nvSpPr>
-        <p:spPr>
-          <a:xfrm rot="10800000">
-            <a:off x="6223514" y="2288397"/>
-            <a:ext cx="332486" cy="286626"/>
-          </a:xfrm>
-          <a:prstGeom prst="triangle">
-            <a:avLst/>
-          </a:prstGeom>
-          <a:solidFill>
-            <a:srgbClr val="D8F893"/>
-          </a:solidFill>
-          <a:ln>
-            <a:noFill/>
-          </a:ln>
-        </p:spPr>
-        <p:style>
-          <a:lnRef idx="2">
-            <a:schemeClr val="accent1">
-              <a:shade val="15000"/>
-            </a:schemeClr>
-          </a:lnRef>
-          <a:fillRef idx="1">
-            <a:schemeClr val="accent1"/>
-          </a:fillRef>
-          <a:effectRef idx="0">
-            <a:schemeClr val="accent1"/>
-          </a:effectRef>
-          <a:fontRef idx="minor">
-            <a:schemeClr val="lt1"/>
-          </a:fontRef>
-        </p:style>
-        <p:txBody>
-          <a:bodyPr rtlCol="0" anchor="ctr"/>
-          <a:lstStyle/>
-          <a:p>
-            <a:pPr algn="ctr"/>
-            <a:endParaRPr lang="en-GB"/>
-          </a:p>
-        </p:txBody>
-      </p:sp>
-      <p:sp>
-        <p:nvSpPr>
           <p:cNvPr id="85" name="TextBox 84">
             <a:extLst>
               <a:ext uri="{FF2B5EF4-FFF2-40B4-BE49-F238E27FC236}">
@@ -11990,7 +11574,7 @@
         </p:nvSpPr>
         <p:spPr>
           <a:xfrm>
-            <a:off x="9530454" y="3167771"/>
+            <a:off x="8406179" y="3883343"/>
             <a:ext cx="189886" cy="189886"/>
           </a:xfrm>
           <a:prstGeom prst="ellipse">
@@ -12042,7 +11626,7 @@
         </p:nvSpPr>
         <p:spPr>
           <a:xfrm>
-            <a:off x="10127926" y="3166274"/>
+            <a:off x="9247698" y="3894377"/>
             <a:ext cx="189886" cy="189886"/>
           </a:xfrm>
           <a:prstGeom prst="ellipse">
@@ -12094,7 +11678,7 @@
         </p:nvSpPr>
         <p:spPr>
           <a:xfrm>
-            <a:off x="9035059" y="3174402"/>
+            <a:off x="7591550" y="3878457"/>
             <a:ext cx="189886" cy="189886"/>
           </a:xfrm>
           <a:prstGeom prst="ellipse">
@@ -12146,7 +11730,7 @@
         </p:nvSpPr>
         <p:spPr>
           <a:xfrm>
-            <a:off x="8511535" y="3185968"/>
+            <a:off x="6803875" y="3884394"/>
             <a:ext cx="189886" cy="189886"/>
           </a:xfrm>
           <a:prstGeom prst="ellipse">
@@ -12198,7 +11782,7 @@
         </p:nvSpPr>
         <p:spPr>
           <a:xfrm>
-            <a:off x="9542639" y="2771303"/>
+            <a:off x="8428958" y="3235638"/>
             <a:ext cx="189886" cy="189886"/>
           </a:xfrm>
           <a:prstGeom prst="ellipse">
@@ -12250,7 +11834,7 @@
         </p:nvSpPr>
         <p:spPr>
           <a:xfrm>
-            <a:off x="10140111" y="2769806"/>
+            <a:off x="9270477" y="3246672"/>
             <a:ext cx="189886" cy="189886"/>
           </a:xfrm>
           <a:prstGeom prst="ellipse">
@@ -12302,7 +11886,7 @@
         </p:nvSpPr>
         <p:spPr>
           <a:xfrm>
-            <a:off x="9047244" y="2777934"/>
+            <a:off x="7614329" y="3230752"/>
             <a:ext cx="189886" cy="189886"/>
           </a:xfrm>
           <a:prstGeom prst="ellipse">
@@ -12354,7 +11938,7 @@
         </p:nvSpPr>
         <p:spPr>
           <a:xfrm>
-            <a:off x="8523720" y="2789500"/>
+            <a:off x="6826654" y="3236689"/>
             <a:ext cx="189886" cy="189886"/>
           </a:xfrm>
           <a:prstGeom prst="ellipse">
@@ -12406,7 +11990,7 @@
         </p:nvSpPr>
         <p:spPr>
           <a:xfrm>
-            <a:off x="9542639" y="1765530"/>
+            <a:off x="8445017" y="1479181"/>
             <a:ext cx="189886" cy="189886"/>
           </a:xfrm>
           <a:prstGeom prst="ellipse">
@@ -12458,7 +12042,7 @@
         </p:nvSpPr>
         <p:spPr>
           <a:xfrm>
-            <a:off x="10140111" y="1764033"/>
+            <a:off x="9286536" y="1490215"/>
             <a:ext cx="189886" cy="189886"/>
           </a:xfrm>
           <a:prstGeom prst="ellipse">
@@ -12510,7 +12094,7 @@
         </p:nvSpPr>
         <p:spPr>
           <a:xfrm>
-            <a:off x="9047244" y="1772161"/>
+            <a:off x="7630388" y="1474295"/>
             <a:ext cx="189886" cy="189886"/>
           </a:xfrm>
           <a:prstGeom prst="ellipse">
@@ -12562,7 +12146,7 @@
         </p:nvSpPr>
         <p:spPr>
           <a:xfrm>
-            <a:off x="8523720" y="1783727"/>
+            <a:off x="6842713" y="1480232"/>
             <a:ext cx="189886" cy="189886"/>
           </a:xfrm>
           <a:prstGeom prst="ellipse">
@@ -12614,7 +12198,7 @@
         </p:nvSpPr>
         <p:spPr>
           <a:xfrm>
-            <a:off x="7296477" y="1740787"/>
+            <a:off x="5615470" y="1437292"/>
             <a:ext cx="1111643" cy="276999"/>
           </a:xfrm>
           <a:prstGeom prst="rect">
@@ -12649,7 +12233,7 @@
         </p:nvSpPr>
         <p:spPr>
           <a:xfrm>
-            <a:off x="7284292" y="2745943"/>
+            <a:off x="5587226" y="3193132"/>
             <a:ext cx="1111643" cy="276999"/>
           </a:xfrm>
           <a:prstGeom prst="rect">
@@ -12684,7 +12268,7 @@
         </p:nvSpPr>
         <p:spPr>
           <a:xfrm>
-            <a:off x="7284292" y="3142411"/>
+            <a:off x="5576632" y="3840837"/>
             <a:ext cx="1111643" cy="276999"/>
           </a:xfrm>
           <a:prstGeom prst="rect">
@@ -12719,7 +12303,7 @@
         </p:nvSpPr>
         <p:spPr>
           <a:xfrm>
-            <a:off x="9542639" y="2418392"/>
+            <a:off x="8445017" y="2621618"/>
             <a:ext cx="189886" cy="189886"/>
           </a:xfrm>
           <a:prstGeom prst="ellipse">
@@ -12771,7 +12355,7 @@
         </p:nvSpPr>
         <p:spPr>
           <a:xfrm>
-            <a:off x="10140111" y="2416895"/>
+            <a:off x="9286536" y="2632652"/>
             <a:ext cx="189886" cy="189886"/>
           </a:xfrm>
           <a:prstGeom prst="ellipse">
@@ -12823,7 +12407,7 @@
         </p:nvSpPr>
         <p:spPr>
           <a:xfrm>
-            <a:off x="9047244" y="2425023"/>
+            <a:off x="7630388" y="2616732"/>
             <a:ext cx="189886" cy="189886"/>
           </a:xfrm>
           <a:prstGeom prst="ellipse">
@@ -12857,7 +12441,7 @@
           <a:lstStyle/>
           <a:p>
             <a:pPr algn="ctr"/>
-            <a:endParaRPr lang="en-GB"/>
+            <a:endParaRPr lang="en-GB" dirty="0"/>
           </a:p>
         </p:txBody>
       </p:sp>
@@ -12875,7 +12459,7 @@
         </p:nvSpPr>
         <p:spPr>
           <a:xfrm>
-            <a:off x="8523720" y="2436589"/>
+            <a:off x="6842713" y="2622669"/>
             <a:ext cx="189886" cy="189886"/>
           </a:xfrm>
           <a:prstGeom prst="ellipse">
@@ -12927,7 +12511,7 @@
         </p:nvSpPr>
         <p:spPr>
           <a:xfrm>
-            <a:off x="9542639" y="2082014"/>
+            <a:off x="8445017" y="2026059"/>
             <a:ext cx="189886" cy="189886"/>
           </a:xfrm>
           <a:prstGeom prst="ellipse">
@@ -12979,7 +12563,7 @@
         </p:nvSpPr>
         <p:spPr>
           <a:xfrm>
-            <a:off x="10140111" y="2080517"/>
+            <a:off x="9286536" y="2037093"/>
             <a:ext cx="189886" cy="189886"/>
           </a:xfrm>
           <a:prstGeom prst="ellipse">
@@ -13031,7 +12615,7 @@
         </p:nvSpPr>
         <p:spPr>
           <a:xfrm>
-            <a:off x="9047244" y="2088645"/>
+            <a:off x="7630388" y="2021173"/>
             <a:ext cx="189886" cy="189886"/>
           </a:xfrm>
           <a:prstGeom prst="ellipse">
@@ -13083,7 +12667,7 @@
         </p:nvSpPr>
         <p:spPr>
           <a:xfrm>
-            <a:off x="8523720" y="2100211"/>
+            <a:off x="6842713" y="2027110"/>
             <a:ext cx="189886" cy="189886"/>
           </a:xfrm>
           <a:prstGeom prst="ellipse">
@@ -13135,8 +12719,8 @@
         </p:nvSpPr>
         <p:spPr>
           <a:xfrm>
-            <a:off x="7284292" y="2056654"/>
-            <a:ext cx="1111643" cy="276999"/>
+            <a:off x="5603285" y="1983553"/>
+            <a:ext cx="1111643" cy="461665"/>
           </a:xfrm>
           <a:prstGeom prst="rect">
             <a:avLst/>
@@ -13151,7 +12735,7 @@
           <a:p>
             <a:r>
               <a:rPr lang="en-GB" sz="1200" dirty="0"/>
-              <a:t>Shades: Dark</a:t>
+              <a:t>Shades: Darkest</a:t>
             </a:r>
           </a:p>
         </p:txBody>
@@ -13170,7 +12754,7 @@
         </p:nvSpPr>
         <p:spPr>
           <a:xfrm>
-            <a:off x="7296477" y="2393032"/>
+            <a:off x="5615470" y="2579112"/>
             <a:ext cx="1111643" cy="276999"/>
           </a:xfrm>
           <a:prstGeom prst="rect">
@@ -13186,7 +12770,7 @@
           <a:p>
             <a:r>
               <a:rPr lang="en-GB" sz="1200" dirty="0"/>
-              <a:t>Shades: Light</a:t>
+              <a:t>Shades: Darker</a:t>
             </a:r>
           </a:p>
         </p:txBody>
@@ -13403,214 +12987,6 @@
       </p:sp>
       <p:sp>
         <p:nvSpPr>
-          <p:cNvPr id="44" name="Triangle 43">
-            <a:extLst>
-              <a:ext uri="{FF2B5EF4-FFF2-40B4-BE49-F238E27FC236}">
-                <a16:creationId xmlns:a16="http://schemas.microsoft.com/office/drawing/2014/main" id="{8C66890B-697A-5175-3F90-FA412C325F7D}"/>
-              </a:ext>
-            </a:extLst>
-          </p:cNvPr>
-          <p:cNvSpPr/>
-          <p:nvPr/>
-        </p:nvSpPr>
-        <p:spPr>
-          <a:xfrm rot="10800000">
-            <a:off x="2097488" y="771292"/>
-            <a:ext cx="332486" cy="286626"/>
-          </a:xfrm>
-          <a:prstGeom prst="triangle">
-            <a:avLst/>
-          </a:prstGeom>
-          <a:solidFill>
-            <a:srgbClr val="D8F893"/>
-          </a:solidFill>
-          <a:ln>
-            <a:noFill/>
-          </a:ln>
-        </p:spPr>
-        <p:style>
-          <a:lnRef idx="2">
-            <a:schemeClr val="accent1">
-              <a:shade val="15000"/>
-            </a:schemeClr>
-          </a:lnRef>
-          <a:fillRef idx="1">
-            <a:schemeClr val="accent1"/>
-          </a:fillRef>
-          <a:effectRef idx="0">
-            <a:schemeClr val="accent1"/>
-          </a:effectRef>
-          <a:fontRef idx="minor">
-            <a:schemeClr val="lt1"/>
-          </a:fontRef>
-        </p:style>
-        <p:txBody>
-          <a:bodyPr rtlCol="0" anchor="ctr"/>
-          <a:lstStyle/>
-          <a:p>
-            <a:pPr algn="ctr"/>
-            <a:endParaRPr lang="en-GB"/>
-          </a:p>
-        </p:txBody>
-      </p:sp>
-      <p:sp>
-        <p:nvSpPr>
-          <p:cNvPr id="45" name="Triangle 44">
-            <a:extLst>
-              <a:ext uri="{FF2B5EF4-FFF2-40B4-BE49-F238E27FC236}">
-                <a16:creationId xmlns:a16="http://schemas.microsoft.com/office/drawing/2014/main" id="{0B083721-0948-F3E5-37CA-79FA6AB9544B}"/>
-              </a:ext>
-            </a:extLst>
-          </p:cNvPr>
-          <p:cNvSpPr/>
-          <p:nvPr/>
-        </p:nvSpPr>
-        <p:spPr>
-          <a:xfrm rot="10800000">
-            <a:off x="4075899" y="897864"/>
-            <a:ext cx="332486" cy="286626"/>
-          </a:xfrm>
-          <a:prstGeom prst="triangle">
-            <a:avLst/>
-          </a:prstGeom>
-          <a:solidFill>
-            <a:srgbClr val="D8F893"/>
-          </a:solidFill>
-          <a:ln>
-            <a:noFill/>
-          </a:ln>
-        </p:spPr>
-        <p:style>
-          <a:lnRef idx="2">
-            <a:schemeClr val="accent1">
-              <a:shade val="15000"/>
-            </a:schemeClr>
-          </a:lnRef>
-          <a:fillRef idx="1">
-            <a:schemeClr val="accent1"/>
-          </a:fillRef>
-          <a:effectRef idx="0">
-            <a:schemeClr val="accent1"/>
-          </a:effectRef>
-          <a:fontRef idx="minor">
-            <a:schemeClr val="lt1"/>
-          </a:fontRef>
-        </p:style>
-        <p:txBody>
-          <a:bodyPr rtlCol="0" anchor="ctr"/>
-          <a:lstStyle/>
-          <a:p>
-            <a:pPr algn="ctr"/>
-            <a:endParaRPr lang="en-GB"/>
-          </a:p>
-        </p:txBody>
-      </p:sp>
-      <p:sp>
-        <p:nvSpPr>
-          <p:cNvPr id="46" name="Triangle 45">
-            <a:extLst>
-              <a:ext uri="{FF2B5EF4-FFF2-40B4-BE49-F238E27FC236}">
-                <a16:creationId xmlns:a16="http://schemas.microsoft.com/office/drawing/2014/main" id="{785979E1-777A-FF99-C6E0-E1749EA52984}"/>
-              </a:ext>
-            </a:extLst>
-          </p:cNvPr>
-          <p:cNvSpPr/>
-          <p:nvPr/>
-        </p:nvSpPr>
-        <p:spPr>
-          <a:xfrm rot="10800000">
-            <a:off x="2071123" y="2936949"/>
-            <a:ext cx="332486" cy="286626"/>
-          </a:xfrm>
-          <a:prstGeom prst="triangle">
-            <a:avLst/>
-          </a:prstGeom>
-          <a:solidFill>
-            <a:srgbClr val="D8F893"/>
-          </a:solidFill>
-          <a:ln>
-            <a:noFill/>
-          </a:ln>
-        </p:spPr>
-        <p:style>
-          <a:lnRef idx="2">
-            <a:schemeClr val="accent1">
-              <a:shade val="15000"/>
-            </a:schemeClr>
-          </a:lnRef>
-          <a:fillRef idx="1">
-            <a:schemeClr val="accent1"/>
-          </a:fillRef>
-          <a:effectRef idx="0">
-            <a:schemeClr val="accent1"/>
-          </a:effectRef>
-          <a:fontRef idx="minor">
-            <a:schemeClr val="lt1"/>
-          </a:fontRef>
-        </p:style>
-        <p:txBody>
-          <a:bodyPr rtlCol="0" anchor="ctr"/>
-          <a:lstStyle/>
-          <a:p>
-            <a:pPr algn="ctr"/>
-            <a:endParaRPr lang="en-GB"/>
-          </a:p>
-        </p:txBody>
-      </p:sp>
-      <p:sp>
-        <p:nvSpPr>
-          <p:cNvPr id="47" name="Triangle 46">
-            <a:extLst>
-              <a:ext uri="{FF2B5EF4-FFF2-40B4-BE49-F238E27FC236}">
-                <a16:creationId xmlns:a16="http://schemas.microsoft.com/office/drawing/2014/main" id="{1C44E183-AF1A-CE60-7176-BBC7779ED919}"/>
-              </a:ext>
-            </a:extLst>
-          </p:cNvPr>
-          <p:cNvSpPr/>
-          <p:nvPr/>
-        </p:nvSpPr>
-        <p:spPr>
-          <a:xfrm rot="10800000">
-            <a:off x="4532097" y="3005076"/>
-            <a:ext cx="332486" cy="286626"/>
-          </a:xfrm>
-          <a:prstGeom prst="triangle">
-            <a:avLst/>
-          </a:prstGeom>
-          <a:solidFill>
-            <a:srgbClr val="D8F893"/>
-          </a:solidFill>
-          <a:ln>
-            <a:noFill/>
-          </a:ln>
-        </p:spPr>
-        <p:style>
-          <a:lnRef idx="2">
-            <a:schemeClr val="accent1">
-              <a:shade val="15000"/>
-            </a:schemeClr>
-          </a:lnRef>
-          <a:fillRef idx="1">
-            <a:schemeClr val="accent1"/>
-          </a:fillRef>
-          <a:effectRef idx="0">
-            <a:schemeClr val="accent1"/>
-          </a:effectRef>
-          <a:fontRef idx="minor">
-            <a:schemeClr val="lt1"/>
-          </a:fontRef>
-        </p:style>
-        <p:txBody>
-          <a:bodyPr rtlCol="0" anchor="ctr"/>
-          <a:lstStyle/>
-          <a:p>
-            <a:pPr algn="ctr"/>
-            <a:endParaRPr lang="en-GB"/>
-          </a:p>
-        </p:txBody>
-      </p:sp>
-      <p:sp>
-        <p:nvSpPr>
           <p:cNvPr id="48" name="Rectangle 47">
             <a:extLst>
               <a:ext uri="{FF2B5EF4-FFF2-40B4-BE49-F238E27FC236}">
@@ -13729,7 +13105,7 @@
         </p:nvCxnSpPr>
         <p:spPr>
           <a:xfrm>
-            <a:off x="8334227" y="988344"/>
+            <a:off x="6653220" y="684849"/>
             <a:ext cx="0" cy="2837061"/>
           </a:xfrm>
           <a:prstGeom prst="line">
@@ -13765,7 +13141,7 @@
         </p:nvSpPr>
         <p:spPr>
           <a:xfrm>
-            <a:off x="8322908" y="1355534"/>
+            <a:off x="6641901" y="1052039"/>
             <a:ext cx="568006" cy="276999"/>
           </a:xfrm>
           <a:prstGeom prst="rect">
@@ -13800,7 +13176,7 @@
         </p:nvSpPr>
         <p:spPr>
           <a:xfrm>
-            <a:off x="8902233" y="1355534"/>
+            <a:off x="7485377" y="1057668"/>
             <a:ext cx="568006" cy="276999"/>
           </a:xfrm>
           <a:prstGeom prst="rect">
@@ -13837,7 +13213,7 @@
         </p:nvCxnSpPr>
         <p:spPr>
           <a:xfrm>
-            <a:off x="8890914" y="994975"/>
+            <a:off x="7474058" y="697109"/>
             <a:ext cx="0" cy="2837061"/>
           </a:xfrm>
           <a:prstGeom prst="line">
@@ -13875,7 +13251,7 @@
         </p:nvCxnSpPr>
         <p:spPr>
           <a:xfrm>
-            <a:off x="9357464" y="994975"/>
+            <a:off x="8259842" y="708626"/>
             <a:ext cx="0" cy="2837061"/>
           </a:xfrm>
           <a:prstGeom prst="line">
@@ -13911,7 +13287,7 @@
         </p:nvSpPr>
         <p:spPr>
           <a:xfrm>
-            <a:off x="9353579" y="1348701"/>
+            <a:off x="8255957" y="1062352"/>
             <a:ext cx="568006" cy="276999"/>
           </a:xfrm>
           <a:prstGeom prst="rect">
@@ -13948,7 +13324,7 @@
         </p:nvCxnSpPr>
         <p:spPr>
           <a:xfrm>
-            <a:off x="9880112" y="1003616"/>
+            <a:off x="9026537" y="729798"/>
             <a:ext cx="0" cy="2837061"/>
           </a:xfrm>
           <a:prstGeom prst="line">
@@ -13984,7 +13360,7 @@
         </p:nvSpPr>
         <p:spPr>
           <a:xfrm>
-            <a:off x="9938866" y="1229122"/>
+            <a:off x="9085291" y="955304"/>
             <a:ext cx="568006" cy="461665"/>
           </a:xfrm>
           <a:prstGeom prst="rect">
@@ -14021,7 +13397,7 @@
         </p:nvCxnSpPr>
         <p:spPr>
           <a:xfrm>
-            <a:off x="10506872" y="974501"/>
+            <a:off x="9876229" y="699917"/>
             <a:ext cx="0" cy="2837061"/>
           </a:xfrm>
           <a:prstGeom prst="line">
@@ -14057,7 +13433,7 @@
         </p:nvSpPr>
         <p:spPr>
           <a:xfrm>
-            <a:off x="10541697" y="1222830"/>
+            <a:off x="9911054" y="948246"/>
             <a:ext cx="677523" cy="461665"/>
           </a:xfrm>
           <a:prstGeom prst="rect">
@@ -14092,7 +13468,7 @@
         </p:nvSpPr>
         <p:spPr>
           <a:xfrm>
-            <a:off x="10709537" y="3177789"/>
+            <a:off x="10052241" y="3905126"/>
             <a:ext cx="189886" cy="189886"/>
           </a:xfrm>
           <a:prstGeom prst="ellipse">
@@ -14144,7 +13520,7 @@
         </p:nvSpPr>
         <p:spPr>
           <a:xfrm>
-            <a:off x="10721722" y="2781321"/>
+            <a:off x="10075020" y="3257421"/>
             <a:ext cx="189886" cy="189886"/>
           </a:xfrm>
           <a:prstGeom prst="ellipse">
@@ -14196,7 +13572,7 @@
         </p:nvSpPr>
         <p:spPr>
           <a:xfrm>
-            <a:off x="10721722" y="1775548"/>
+            <a:off x="10091079" y="1500964"/>
             <a:ext cx="189886" cy="189886"/>
           </a:xfrm>
           <a:prstGeom prst="ellipse">
@@ -14248,7 +13624,7 @@
         </p:nvSpPr>
         <p:spPr>
           <a:xfrm>
-            <a:off x="10721722" y="2428410"/>
+            <a:off x="10091079" y="2643401"/>
             <a:ext cx="189886" cy="189886"/>
           </a:xfrm>
           <a:prstGeom prst="ellipse">
@@ -14300,7 +13676,7 @@
         </p:nvSpPr>
         <p:spPr>
           <a:xfrm>
-            <a:off x="10721722" y="2092032"/>
+            <a:off x="10091079" y="2047842"/>
             <a:ext cx="189886" cy="189886"/>
           </a:xfrm>
           <a:prstGeom prst="ellipse">
@@ -14352,7 +13728,7 @@
         </p:nvSpPr>
         <p:spPr>
           <a:xfrm>
-            <a:off x="6580555" y="4490520"/>
+            <a:off x="5944049" y="5283766"/>
             <a:ext cx="398001" cy="398001"/>
           </a:xfrm>
           <a:prstGeom prst="ellipse">
@@ -14404,7 +13780,7 @@
         </p:nvSpPr>
         <p:spPr>
           <a:xfrm>
-            <a:off x="5667912" y="4535178"/>
+            <a:off x="5031406" y="5328424"/>
             <a:ext cx="1111643" cy="276999"/>
           </a:xfrm>
           <a:prstGeom prst="rect">
@@ -14439,7 +13815,7 @@
         </p:nvSpPr>
         <p:spPr>
           <a:xfrm>
-            <a:off x="6580555" y="5021090"/>
+            <a:off x="5944049" y="5814336"/>
             <a:ext cx="398001" cy="398001"/>
           </a:xfrm>
           <a:prstGeom prst="ellipse">
@@ -14491,7 +13867,7 @@
         </p:nvSpPr>
         <p:spPr>
           <a:xfrm>
-            <a:off x="5667911" y="5081590"/>
+            <a:off x="5031405" y="5874836"/>
             <a:ext cx="1111643" cy="276999"/>
           </a:xfrm>
           <a:prstGeom prst="rect">
@@ -14578,7 +13954,7 @@
         </p:nvSpPr>
         <p:spPr>
           <a:xfrm>
-            <a:off x="6580555" y="5567502"/>
+            <a:off x="5944049" y="6360748"/>
             <a:ext cx="398001" cy="398001"/>
           </a:xfrm>
           <a:prstGeom prst="ellipse">
@@ -14630,7 +14006,7 @@
         </p:nvSpPr>
         <p:spPr>
           <a:xfrm>
-            <a:off x="5667911" y="5628002"/>
+            <a:off x="5031405" y="6421248"/>
             <a:ext cx="1111643" cy="276999"/>
           </a:xfrm>
           <a:prstGeom prst="rect">
@@ -14647,6 +14023,1352 @@
             <a:r>
               <a:rPr lang="en-GB" sz="1200" dirty="0"/>
               <a:t>Light grey</a:t>
+            </a:r>
+          </a:p>
+        </p:txBody>
+      </p:sp>
+      <p:sp>
+        <p:nvSpPr>
+          <p:cNvPr id="115" name="TextBox 114">
+            <a:extLst>
+              <a:ext uri="{FF2B5EF4-FFF2-40B4-BE49-F238E27FC236}">
+                <a16:creationId xmlns:a16="http://schemas.microsoft.com/office/drawing/2014/main" id="{EFF1046D-A6FA-B15A-1A70-A0EC0C329A12}"/>
+              </a:ext>
+            </a:extLst>
+          </p:cNvPr>
+          <p:cNvSpPr txBox="1"/>
+          <p:nvPr/>
+        </p:nvSpPr>
+        <p:spPr>
+          <a:xfrm>
+            <a:off x="6688275" y="1703101"/>
+            <a:ext cx="773596" cy="246221"/>
+          </a:xfrm>
+          <a:prstGeom prst="rect">
+            <a:avLst/>
+          </a:prstGeom>
+          <a:noFill/>
+        </p:spPr>
+        <p:txBody>
+          <a:bodyPr wrap="square" rtlCol="0">
+            <a:spAutoFit/>
+          </a:bodyPr>
+          <a:lstStyle/>
+          <a:p>
+            <a:r>
+              <a:rPr lang="en-GB" sz="1000" dirty="0"/>
+              <a:t>30CED1</a:t>
+            </a:r>
+          </a:p>
+        </p:txBody>
+      </p:sp>
+      <p:sp>
+        <p:nvSpPr>
+          <p:cNvPr id="118" name="TextBox 117">
+            <a:extLst>
+              <a:ext uri="{FF2B5EF4-FFF2-40B4-BE49-F238E27FC236}">
+                <a16:creationId xmlns:a16="http://schemas.microsoft.com/office/drawing/2014/main" id="{2120227A-A3A0-FC07-3309-20A83BCFBF68}"/>
+              </a:ext>
+            </a:extLst>
+          </p:cNvPr>
+          <p:cNvSpPr txBox="1"/>
+          <p:nvPr/>
+        </p:nvSpPr>
+        <p:spPr>
+          <a:xfrm>
+            <a:off x="7483493" y="1710336"/>
+            <a:ext cx="773596" cy="246221"/>
+          </a:xfrm>
+          <a:prstGeom prst="rect">
+            <a:avLst/>
+          </a:prstGeom>
+          <a:noFill/>
+        </p:spPr>
+        <p:txBody>
+          <a:bodyPr wrap="square" rtlCol="0">
+            <a:spAutoFit/>
+          </a:bodyPr>
+          <a:lstStyle/>
+          <a:p>
+            <a:r>
+              <a:rPr lang="en-GB" sz="1000" dirty="0"/>
+              <a:t>E0BE36</a:t>
+            </a:r>
+          </a:p>
+        </p:txBody>
+      </p:sp>
+      <p:sp>
+        <p:nvSpPr>
+          <p:cNvPr id="119" name="TextBox 118">
+            <a:extLst>
+              <a:ext uri="{FF2B5EF4-FFF2-40B4-BE49-F238E27FC236}">
+                <a16:creationId xmlns:a16="http://schemas.microsoft.com/office/drawing/2014/main" id="{3664B159-CB7C-FA6D-4B98-12F7EA798209}"/>
+              </a:ext>
+            </a:extLst>
+          </p:cNvPr>
+          <p:cNvSpPr txBox="1"/>
+          <p:nvPr/>
+        </p:nvSpPr>
+        <p:spPr>
+          <a:xfrm>
+            <a:off x="8287527" y="1716496"/>
+            <a:ext cx="773596" cy="246221"/>
+          </a:xfrm>
+          <a:prstGeom prst="rect">
+            <a:avLst/>
+          </a:prstGeom>
+          <a:noFill/>
+        </p:spPr>
+        <p:txBody>
+          <a:bodyPr wrap="square" rtlCol="0">
+            <a:spAutoFit/>
+          </a:bodyPr>
+          <a:lstStyle/>
+          <a:p>
+            <a:r>
+              <a:rPr lang="en-GB" sz="1000" dirty="0"/>
+              <a:t>FA8A5B</a:t>
+            </a:r>
+          </a:p>
+        </p:txBody>
+      </p:sp>
+      <p:sp>
+        <p:nvSpPr>
+          <p:cNvPr id="120" name="TextBox 119">
+            <a:extLst>
+              <a:ext uri="{FF2B5EF4-FFF2-40B4-BE49-F238E27FC236}">
+                <a16:creationId xmlns:a16="http://schemas.microsoft.com/office/drawing/2014/main" id="{8A69449C-4128-D13B-74EE-1B7C12DCF1CA}"/>
+              </a:ext>
+            </a:extLst>
+          </p:cNvPr>
+          <p:cNvSpPr txBox="1"/>
+          <p:nvPr/>
+        </p:nvSpPr>
+        <p:spPr>
+          <a:xfrm>
+            <a:off x="9055606" y="1710336"/>
+            <a:ext cx="773596" cy="246221"/>
+          </a:xfrm>
+          <a:prstGeom prst="rect">
+            <a:avLst/>
+          </a:prstGeom>
+          <a:noFill/>
+        </p:spPr>
+        <p:txBody>
+          <a:bodyPr wrap="square" rtlCol="0">
+            <a:spAutoFit/>
+          </a:bodyPr>
+          <a:lstStyle/>
+          <a:p>
+            <a:r>
+              <a:rPr lang="en-GB" sz="1000" dirty="0"/>
+              <a:t>EB526F</a:t>
+            </a:r>
+          </a:p>
+        </p:txBody>
+      </p:sp>
+      <p:sp>
+        <p:nvSpPr>
+          <p:cNvPr id="121" name="TextBox 120">
+            <a:extLst>
+              <a:ext uri="{FF2B5EF4-FFF2-40B4-BE49-F238E27FC236}">
+                <a16:creationId xmlns:a16="http://schemas.microsoft.com/office/drawing/2014/main" id="{CE9E84EC-2570-6543-BFDE-C1719AC3E076}"/>
+              </a:ext>
+            </a:extLst>
+          </p:cNvPr>
+          <p:cNvSpPr txBox="1"/>
+          <p:nvPr/>
+        </p:nvSpPr>
+        <p:spPr>
+          <a:xfrm>
+            <a:off x="9927469" y="1738055"/>
+            <a:ext cx="773596" cy="246221"/>
+          </a:xfrm>
+          <a:prstGeom prst="rect">
+            <a:avLst/>
+          </a:prstGeom>
+          <a:noFill/>
+        </p:spPr>
+        <p:txBody>
+          <a:bodyPr wrap="square" rtlCol="0">
+            <a:spAutoFit/>
+          </a:bodyPr>
+          <a:lstStyle/>
+          <a:p>
+            <a:r>
+              <a:rPr lang="en-GB" sz="1000" dirty="0"/>
+              <a:t>D8F794</a:t>
+            </a:r>
+          </a:p>
+        </p:txBody>
+      </p:sp>
+      <p:sp>
+        <p:nvSpPr>
+          <p:cNvPr id="147" name="TextBox 146">
+            <a:extLst>
+              <a:ext uri="{FF2B5EF4-FFF2-40B4-BE49-F238E27FC236}">
+                <a16:creationId xmlns:a16="http://schemas.microsoft.com/office/drawing/2014/main" id="{0111FEA4-3C78-0000-5DA7-6AE9A7FDAEA5}"/>
+              </a:ext>
+            </a:extLst>
+          </p:cNvPr>
+          <p:cNvSpPr txBox="1"/>
+          <p:nvPr/>
+        </p:nvSpPr>
+        <p:spPr>
+          <a:xfrm>
+            <a:off x="6661178" y="2304029"/>
+            <a:ext cx="773596" cy="246221"/>
+          </a:xfrm>
+          <a:prstGeom prst="rect">
+            <a:avLst/>
+          </a:prstGeom>
+          <a:noFill/>
+        </p:spPr>
+        <p:txBody>
+          <a:bodyPr wrap="square" rtlCol="0">
+            <a:spAutoFit/>
+          </a:bodyPr>
+          <a:lstStyle/>
+          <a:p>
+            <a:r>
+              <a:rPr lang="en-GB" sz="1000" dirty="0"/>
+              <a:t>105052</a:t>
+            </a:r>
+          </a:p>
+        </p:txBody>
+      </p:sp>
+      <p:sp>
+        <p:nvSpPr>
+          <p:cNvPr id="148" name="TextBox 147">
+            <a:extLst>
+              <a:ext uri="{FF2B5EF4-FFF2-40B4-BE49-F238E27FC236}">
+                <a16:creationId xmlns:a16="http://schemas.microsoft.com/office/drawing/2014/main" id="{5EF631E0-1131-650F-1BCF-3DAF88EF1A5C}"/>
+              </a:ext>
+            </a:extLst>
+          </p:cNvPr>
+          <p:cNvSpPr txBox="1"/>
+          <p:nvPr/>
+        </p:nvSpPr>
+        <p:spPr>
+          <a:xfrm>
+            <a:off x="7456396" y="2311264"/>
+            <a:ext cx="773596" cy="246221"/>
+          </a:xfrm>
+          <a:prstGeom prst="rect">
+            <a:avLst/>
+          </a:prstGeom>
+          <a:noFill/>
+        </p:spPr>
+        <p:txBody>
+          <a:bodyPr wrap="square" rtlCol="0">
+            <a:spAutoFit/>
+          </a:bodyPr>
+          <a:lstStyle/>
+          <a:p>
+            <a:r>
+              <a:rPr lang="en-GB" sz="1000" dirty="0"/>
+              <a:t>615216</a:t>
+            </a:r>
+          </a:p>
+        </p:txBody>
+      </p:sp>
+      <p:sp>
+        <p:nvSpPr>
+          <p:cNvPr id="149" name="TextBox 148">
+            <a:extLst>
+              <a:ext uri="{FF2B5EF4-FFF2-40B4-BE49-F238E27FC236}">
+                <a16:creationId xmlns:a16="http://schemas.microsoft.com/office/drawing/2014/main" id="{EB2A69BE-633C-18ED-4A72-2C127C318D4A}"/>
+              </a:ext>
+            </a:extLst>
+          </p:cNvPr>
+          <p:cNvSpPr txBox="1"/>
+          <p:nvPr/>
+        </p:nvSpPr>
+        <p:spPr>
+          <a:xfrm>
+            <a:off x="8260430" y="2317424"/>
+            <a:ext cx="773596" cy="246221"/>
+          </a:xfrm>
+          <a:prstGeom prst="rect">
+            <a:avLst/>
+          </a:prstGeom>
+          <a:noFill/>
+        </p:spPr>
+        <p:txBody>
+          <a:bodyPr wrap="square" rtlCol="0">
+            <a:spAutoFit/>
+          </a:bodyPr>
+          <a:lstStyle/>
+          <a:p>
+            <a:r>
+              <a:rPr lang="en-GB" sz="1000" dirty="0"/>
+              <a:t>80452E</a:t>
+            </a:r>
+          </a:p>
+        </p:txBody>
+      </p:sp>
+      <p:sp>
+        <p:nvSpPr>
+          <p:cNvPr id="150" name="TextBox 149">
+            <a:extLst>
+              <a:ext uri="{FF2B5EF4-FFF2-40B4-BE49-F238E27FC236}">
+                <a16:creationId xmlns:a16="http://schemas.microsoft.com/office/drawing/2014/main" id="{9B22AC29-2B3D-811B-3481-3E98BC8A3DB1}"/>
+              </a:ext>
+            </a:extLst>
+          </p:cNvPr>
+          <p:cNvSpPr txBox="1"/>
+          <p:nvPr/>
+        </p:nvSpPr>
+        <p:spPr>
+          <a:xfrm>
+            <a:off x="9028509" y="2311264"/>
+            <a:ext cx="773596" cy="246221"/>
+          </a:xfrm>
+          <a:prstGeom prst="rect">
+            <a:avLst/>
+          </a:prstGeom>
+          <a:noFill/>
+        </p:spPr>
+        <p:txBody>
+          <a:bodyPr wrap="square" rtlCol="0">
+            <a:spAutoFit/>
+          </a:bodyPr>
+          <a:lstStyle/>
+          <a:p>
+            <a:r>
+              <a:rPr lang="en-GB" sz="1000" dirty="0"/>
+              <a:t>6B2332</a:t>
+            </a:r>
+          </a:p>
+        </p:txBody>
+      </p:sp>
+      <p:sp>
+        <p:nvSpPr>
+          <p:cNvPr id="151" name="TextBox 150">
+            <a:extLst>
+              <a:ext uri="{FF2B5EF4-FFF2-40B4-BE49-F238E27FC236}">
+                <a16:creationId xmlns:a16="http://schemas.microsoft.com/office/drawing/2014/main" id="{CB23656E-C0D9-DC47-6630-7774C6ABCD81}"/>
+              </a:ext>
+            </a:extLst>
+          </p:cNvPr>
+          <p:cNvSpPr txBox="1"/>
+          <p:nvPr/>
+        </p:nvSpPr>
+        <p:spPr>
+          <a:xfrm>
+            <a:off x="9900372" y="2338983"/>
+            <a:ext cx="773596" cy="246221"/>
+          </a:xfrm>
+          <a:prstGeom prst="rect">
+            <a:avLst/>
+          </a:prstGeom>
+          <a:noFill/>
+        </p:spPr>
+        <p:txBody>
+          <a:bodyPr wrap="square" rtlCol="0">
+            <a:spAutoFit/>
+          </a:bodyPr>
+          <a:lstStyle/>
+          <a:p>
+            <a:r>
+              <a:rPr lang="en-GB" sz="1000" dirty="0"/>
+              <a:t>697847</a:t>
+            </a:r>
+          </a:p>
+        </p:txBody>
+      </p:sp>
+      <p:sp>
+        <p:nvSpPr>
+          <p:cNvPr id="152" name="TextBox 151">
+            <a:extLst>
+              <a:ext uri="{FF2B5EF4-FFF2-40B4-BE49-F238E27FC236}">
+                <a16:creationId xmlns:a16="http://schemas.microsoft.com/office/drawing/2014/main" id="{0388C8B3-41D8-BDB3-ECBF-636BABCA9D7F}"/>
+              </a:ext>
+            </a:extLst>
+          </p:cNvPr>
+          <p:cNvSpPr txBox="1"/>
+          <p:nvPr/>
+        </p:nvSpPr>
+        <p:spPr>
+          <a:xfrm>
+            <a:off x="6688980" y="2931800"/>
+            <a:ext cx="773596" cy="246221"/>
+          </a:xfrm>
+          <a:prstGeom prst="rect">
+            <a:avLst/>
+          </a:prstGeom>
+          <a:noFill/>
+        </p:spPr>
+        <p:txBody>
+          <a:bodyPr wrap="square" rtlCol="0">
+            <a:spAutoFit/>
+          </a:bodyPr>
+          <a:lstStyle/>
+          <a:p>
+            <a:r>
+              <a:rPr lang="en-GB" sz="1000" dirty="0"/>
+              <a:t>1E8F91</a:t>
+            </a:r>
+          </a:p>
+        </p:txBody>
+      </p:sp>
+      <p:sp>
+        <p:nvSpPr>
+          <p:cNvPr id="153" name="TextBox 152">
+            <a:extLst>
+              <a:ext uri="{FF2B5EF4-FFF2-40B4-BE49-F238E27FC236}">
+                <a16:creationId xmlns:a16="http://schemas.microsoft.com/office/drawing/2014/main" id="{0C84F095-3E0A-8CB8-B113-62600CB4752E}"/>
+              </a:ext>
+            </a:extLst>
+          </p:cNvPr>
+          <p:cNvSpPr txBox="1"/>
+          <p:nvPr/>
+        </p:nvSpPr>
+        <p:spPr>
+          <a:xfrm>
+            <a:off x="7484198" y="2939035"/>
+            <a:ext cx="773596" cy="246221"/>
+          </a:xfrm>
+          <a:prstGeom prst="rect">
+            <a:avLst/>
+          </a:prstGeom>
+          <a:noFill/>
+        </p:spPr>
+        <p:txBody>
+          <a:bodyPr wrap="square" rtlCol="0">
+            <a:spAutoFit/>
+          </a:bodyPr>
+          <a:lstStyle/>
+          <a:p>
+            <a:r>
+              <a:rPr lang="en-GB" sz="1000" dirty="0"/>
+              <a:t>A18826</a:t>
+            </a:r>
+          </a:p>
+        </p:txBody>
+      </p:sp>
+      <p:sp>
+        <p:nvSpPr>
+          <p:cNvPr id="154" name="TextBox 153">
+            <a:extLst>
+              <a:ext uri="{FF2B5EF4-FFF2-40B4-BE49-F238E27FC236}">
+                <a16:creationId xmlns:a16="http://schemas.microsoft.com/office/drawing/2014/main" id="{3FF4B5F8-345B-2844-EB59-D1490FEFD806}"/>
+              </a:ext>
+            </a:extLst>
+          </p:cNvPr>
+          <p:cNvSpPr txBox="1"/>
+          <p:nvPr/>
+        </p:nvSpPr>
+        <p:spPr>
+          <a:xfrm>
+            <a:off x="8288232" y="2945195"/>
+            <a:ext cx="773596" cy="246221"/>
+          </a:xfrm>
+          <a:prstGeom prst="rect">
+            <a:avLst/>
+          </a:prstGeom>
+          <a:noFill/>
+        </p:spPr>
+        <p:txBody>
+          <a:bodyPr wrap="square" rtlCol="0">
+            <a:spAutoFit/>
+          </a:bodyPr>
+          <a:lstStyle/>
+          <a:p>
+            <a:r>
+              <a:rPr lang="en-GB" sz="1000" dirty="0"/>
+              <a:t>C06845</a:t>
+            </a:r>
+          </a:p>
+        </p:txBody>
+      </p:sp>
+      <p:sp>
+        <p:nvSpPr>
+          <p:cNvPr id="155" name="TextBox 154">
+            <a:extLst>
+              <a:ext uri="{FF2B5EF4-FFF2-40B4-BE49-F238E27FC236}">
+                <a16:creationId xmlns:a16="http://schemas.microsoft.com/office/drawing/2014/main" id="{CEA5369A-380A-8D16-5254-ABF7801032ED}"/>
+              </a:ext>
+            </a:extLst>
+          </p:cNvPr>
+          <p:cNvSpPr txBox="1"/>
+          <p:nvPr/>
+        </p:nvSpPr>
+        <p:spPr>
+          <a:xfrm>
+            <a:off x="9056311" y="2939035"/>
+            <a:ext cx="773596" cy="246221"/>
+          </a:xfrm>
+          <a:prstGeom prst="rect">
+            <a:avLst/>
+          </a:prstGeom>
+          <a:noFill/>
+        </p:spPr>
+        <p:txBody>
+          <a:bodyPr wrap="square" rtlCol="0">
+            <a:spAutoFit/>
+          </a:bodyPr>
+          <a:lstStyle/>
+          <a:p>
+            <a:r>
+              <a:rPr lang="en-GB" sz="1000" dirty="0"/>
+              <a:t>AA3D4F</a:t>
+            </a:r>
+          </a:p>
+        </p:txBody>
+      </p:sp>
+      <p:sp>
+        <p:nvSpPr>
+          <p:cNvPr id="156" name="TextBox 155">
+            <a:extLst>
+              <a:ext uri="{FF2B5EF4-FFF2-40B4-BE49-F238E27FC236}">
+                <a16:creationId xmlns:a16="http://schemas.microsoft.com/office/drawing/2014/main" id="{CF8419D8-3272-5C76-547C-BC6315E5EC7C}"/>
+              </a:ext>
+            </a:extLst>
+          </p:cNvPr>
+          <p:cNvSpPr txBox="1"/>
+          <p:nvPr/>
+        </p:nvSpPr>
+        <p:spPr>
+          <a:xfrm>
+            <a:off x="9928174" y="2966754"/>
+            <a:ext cx="773596" cy="246221"/>
+          </a:xfrm>
+          <a:prstGeom prst="rect">
+            <a:avLst/>
+          </a:prstGeom>
+          <a:noFill/>
+        </p:spPr>
+        <p:txBody>
+          <a:bodyPr wrap="square" rtlCol="0">
+            <a:spAutoFit/>
+          </a:bodyPr>
+          <a:lstStyle/>
+          <a:p>
+            <a:r>
+              <a:rPr lang="en-GB" sz="1000" dirty="0"/>
+              <a:t>A1B86D</a:t>
+            </a:r>
+          </a:p>
+        </p:txBody>
+      </p:sp>
+      <p:sp>
+        <p:nvSpPr>
+          <p:cNvPr id="157" name="TextBox 156">
+            <a:extLst>
+              <a:ext uri="{FF2B5EF4-FFF2-40B4-BE49-F238E27FC236}">
+                <a16:creationId xmlns:a16="http://schemas.microsoft.com/office/drawing/2014/main" id="{7EED0A3E-A1A3-A593-8A64-85CB555C3F72}"/>
+              </a:ext>
+            </a:extLst>
+          </p:cNvPr>
+          <p:cNvSpPr txBox="1"/>
+          <p:nvPr/>
+        </p:nvSpPr>
+        <p:spPr>
+          <a:xfrm>
+            <a:off x="6688275" y="3508120"/>
+            <a:ext cx="773596" cy="246221"/>
+          </a:xfrm>
+          <a:prstGeom prst="rect">
+            <a:avLst/>
+          </a:prstGeom>
+          <a:noFill/>
+        </p:spPr>
+        <p:txBody>
+          <a:bodyPr wrap="square" rtlCol="0">
+            <a:spAutoFit/>
+          </a:bodyPr>
+          <a:lstStyle/>
+          <a:p>
+            <a:r>
+              <a:rPr lang="en-GB" sz="1000" dirty="0"/>
+              <a:t>1B8385</a:t>
+            </a:r>
+          </a:p>
+        </p:txBody>
+      </p:sp>
+      <p:sp>
+        <p:nvSpPr>
+          <p:cNvPr id="158" name="TextBox 157">
+            <a:extLst>
+              <a:ext uri="{FF2B5EF4-FFF2-40B4-BE49-F238E27FC236}">
+                <a16:creationId xmlns:a16="http://schemas.microsoft.com/office/drawing/2014/main" id="{CB902AA4-F8A7-E7ED-66C4-E4DA08417802}"/>
+              </a:ext>
+            </a:extLst>
+          </p:cNvPr>
+          <p:cNvSpPr txBox="1"/>
+          <p:nvPr/>
+        </p:nvSpPr>
+        <p:spPr>
+          <a:xfrm>
+            <a:off x="7483493" y="3515355"/>
+            <a:ext cx="773596" cy="246221"/>
+          </a:xfrm>
+          <a:prstGeom prst="rect">
+            <a:avLst/>
+          </a:prstGeom>
+          <a:noFill/>
+        </p:spPr>
+        <p:txBody>
+          <a:bodyPr wrap="square" rtlCol="0">
+            <a:spAutoFit/>
+          </a:bodyPr>
+          <a:lstStyle/>
+          <a:p>
+            <a:r>
+              <a:rPr lang="en-GB" sz="1000" dirty="0"/>
+              <a:t>947A14</a:t>
+            </a:r>
+          </a:p>
+        </p:txBody>
+      </p:sp>
+      <p:sp>
+        <p:nvSpPr>
+          <p:cNvPr id="159" name="TextBox 158">
+            <a:extLst>
+              <a:ext uri="{FF2B5EF4-FFF2-40B4-BE49-F238E27FC236}">
+                <a16:creationId xmlns:a16="http://schemas.microsoft.com/office/drawing/2014/main" id="{3C667660-FDFD-45BE-2D7B-A497A52B897D}"/>
+              </a:ext>
+            </a:extLst>
+          </p:cNvPr>
+          <p:cNvSpPr txBox="1"/>
+          <p:nvPr/>
+        </p:nvSpPr>
+        <p:spPr>
+          <a:xfrm>
+            <a:off x="8287527" y="3521515"/>
+            <a:ext cx="773596" cy="246221"/>
+          </a:xfrm>
+          <a:prstGeom prst="rect">
+            <a:avLst/>
+          </a:prstGeom>
+          <a:noFill/>
+        </p:spPr>
+        <p:txBody>
+          <a:bodyPr wrap="square" rtlCol="0">
+            <a:spAutoFit/>
+          </a:bodyPr>
+          <a:lstStyle/>
+          <a:p>
+            <a:r>
+              <a:rPr lang="en-GB" sz="1000" dirty="0"/>
+              <a:t>B3542F</a:t>
+            </a:r>
+          </a:p>
+        </p:txBody>
+      </p:sp>
+      <p:sp>
+        <p:nvSpPr>
+          <p:cNvPr id="160" name="TextBox 159">
+            <a:extLst>
+              <a:ext uri="{FF2B5EF4-FFF2-40B4-BE49-F238E27FC236}">
+                <a16:creationId xmlns:a16="http://schemas.microsoft.com/office/drawing/2014/main" id="{22626A66-CB6C-581D-A32A-80BD98E7B738}"/>
+              </a:ext>
+            </a:extLst>
+          </p:cNvPr>
+          <p:cNvSpPr txBox="1"/>
+          <p:nvPr/>
+        </p:nvSpPr>
+        <p:spPr>
+          <a:xfrm>
+            <a:off x="9055606" y="3515355"/>
+            <a:ext cx="773596" cy="246221"/>
+          </a:xfrm>
+          <a:prstGeom prst="rect">
+            <a:avLst/>
+          </a:prstGeom>
+          <a:noFill/>
+        </p:spPr>
+        <p:txBody>
+          <a:bodyPr wrap="square" rtlCol="0">
+            <a:spAutoFit/>
+          </a:bodyPr>
+          <a:lstStyle/>
+          <a:p>
+            <a:r>
+              <a:rPr lang="en-GB" sz="1000" dirty="0"/>
+              <a:t>9E283D</a:t>
+            </a:r>
+          </a:p>
+        </p:txBody>
+      </p:sp>
+      <p:sp>
+        <p:nvSpPr>
+          <p:cNvPr id="161" name="TextBox 160">
+            <a:extLst>
+              <a:ext uri="{FF2B5EF4-FFF2-40B4-BE49-F238E27FC236}">
+                <a16:creationId xmlns:a16="http://schemas.microsoft.com/office/drawing/2014/main" id="{317FF068-3FC3-5DA5-BE93-31454F5FDA87}"/>
+              </a:ext>
+            </a:extLst>
+          </p:cNvPr>
+          <p:cNvSpPr txBox="1"/>
+          <p:nvPr/>
+        </p:nvSpPr>
+        <p:spPr>
+          <a:xfrm>
+            <a:off x="9927469" y="3543074"/>
+            <a:ext cx="773596" cy="246221"/>
+          </a:xfrm>
+          <a:prstGeom prst="rect">
+            <a:avLst/>
+          </a:prstGeom>
+          <a:noFill/>
+        </p:spPr>
+        <p:txBody>
+          <a:bodyPr wrap="square" rtlCol="0">
+            <a:spAutoFit/>
+          </a:bodyPr>
+          <a:lstStyle/>
+          <a:p>
+            <a:r>
+              <a:rPr lang="en-GB" sz="1000" dirty="0"/>
+              <a:t>90AB55</a:t>
+            </a:r>
+          </a:p>
+        </p:txBody>
+      </p:sp>
+      <p:sp>
+        <p:nvSpPr>
+          <p:cNvPr id="162" name="TextBox 161">
+            <a:extLst>
+              <a:ext uri="{FF2B5EF4-FFF2-40B4-BE49-F238E27FC236}">
+                <a16:creationId xmlns:a16="http://schemas.microsoft.com/office/drawing/2014/main" id="{66B756F3-9C22-75FC-DE50-60B878A124D6}"/>
+              </a:ext>
+            </a:extLst>
+          </p:cNvPr>
+          <p:cNvSpPr txBox="1"/>
+          <p:nvPr/>
+        </p:nvSpPr>
+        <p:spPr>
+          <a:xfrm>
+            <a:off x="6590181" y="4170130"/>
+            <a:ext cx="773596" cy="246221"/>
+          </a:xfrm>
+          <a:prstGeom prst="rect">
+            <a:avLst/>
+          </a:prstGeom>
+          <a:noFill/>
+        </p:spPr>
+        <p:txBody>
+          <a:bodyPr wrap="square" rtlCol="0">
+            <a:spAutoFit/>
+          </a:bodyPr>
+          <a:lstStyle/>
+          <a:p>
+            <a:r>
+              <a:rPr lang="en-GB" sz="1000" dirty="0"/>
+              <a:t>D13BA4</a:t>
+            </a:r>
+          </a:p>
+        </p:txBody>
+      </p:sp>
+      <p:sp>
+        <p:nvSpPr>
+          <p:cNvPr id="163" name="TextBox 162">
+            <a:extLst>
+              <a:ext uri="{FF2B5EF4-FFF2-40B4-BE49-F238E27FC236}">
+                <a16:creationId xmlns:a16="http://schemas.microsoft.com/office/drawing/2014/main" id="{9B3D62E1-052D-C111-7FBD-4C99DA1AF264}"/>
+              </a:ext>
+            </a:extLst>
+          </p:cNvPr>
+          <p:cNvSpPr txBox="1"/>
+          <p:nvPr/>
+        </p:nvSpPr>
+        <p:spPr>
+          <a:xfrm>
+            <a:off x="7385399" y="4177365"/>
+            <a:ext cx="773596" cy="246221"/>
+          </a:xfrm>
+          <a:prstGeom prst="rect">
+            <a:avLst/>
+          </a:prstGeom>
+          <a:noFill/>
+        </p:spPr>
+        <p:txBody>
+          <a:bodyPr wrap="square" rtlCol="0">
+            <a:spAutoFit/>
+          </a:bodyPr>
+          <a:lstStyle/>
+          <a:p>
+            <a:r>
+              <a:rPr lang="en-GB" sz="1000" dirty="0"/>
+              <a:t>4CE0D0</a:t>
+            </a:r>
+          </a:p>
+        </p:txBody>
+      </p:sp>
+      <p:sp>
+        <p:nvSpPr>
+          <p:cNvPr id="164" name="TextBox 163">
+            <a:extLst>
+              <a:ext uri="{FF2B5EF4-FFF2-40B4-BE49-F238E27FC236}">
+                <a16:creationId xmlns:a16="http://schemas.microsoft.com/office/drawing/2014/main" id="{D9FE4EB1-C291-1AC0-E451-22C79F140624}"/>
+              </a:ext>
+            </a:extLst>
+          </p:cNvPr>
+          <p:cNvSpPr txBox="1"/>
+          <p:nvPr/>
+        </p:nvSpPr>
+        <p:spPr>
+          <a:xfrm>
+            <a:off x="8189433" y="4183525"/>
+            <a:ext cx="773596" cy="246221"/>
+          </a:xfrm>
+          <a:prstGeom prst="rect">
+            <a:avLst/>
+          </a:prstGeom>
+          <a:noFill/>
+        </p:spPr>
+        <p:txBody>
+          <a:bodyPr wrap="square" rtlCol="0">
+            <a:spAutoFit/>
+          </a:bodyPr>
+          <a:lstStyle/>
+          <a:p>
+            <a:r>
+              <a:rPr lang="en-GB" sz="1000" dirty="0"/>
+              <a:t>A7FF75</a:t>
+            </a:r>
+          </a:p>
+        </p:txBody>
+      </p:sp>
+      <p:sp>
+        <p:nvSpPr>
+          <p:cNvPr id="165" name="TextBox 164">
+            <a:extLst>
+              <a:ext uri="{FF2B5EF4-FFF2-40B4-BE49-F238E27FC236}">
+                <a16:creationId xmlns:a16="http://schemas.microsoft.com/office/drawing/2014/main" id="{52347C31-652C-A458-4060-0CAAD3CAE4F5}"/>
+              </a:ext>
+            </a:extLst>
+          </p:cNvPr>
+          <p:cNvSpPr txBox="1"/>
+          <p:nvPr/>
+        </p:nvSpPr>
+        <p:spPr>
+          <a:xfrm>
+            <a:off x="8957512" y="4177365"/>
+            <a:ext cx="773596" cy="246221"/>
+          </a:xfrm>
+          <a:prstGeom prst="rect">
+            <a:avLst/>
+          </a:prstGeom>
+          <a:noFill/>
+        </p:spPr>
+        <p:txBody>
+          <a:bodyPr wrap="square" rtlCol="0">
+            <a:spAutoFit/>
+          </a:bodyPr>
+          <a:lstStyle/>
+          <a:p>
+            <a:r>
+              <a:rPr lang="en-GB" sz="1000" dirty="0"/>
+              <a:t>EBE46A</a:t>
+            </a:r>
+          </a:p>
+        </p:txBody>
+      </p:sp>
+      <p:sp>
+        <p:nvSpPr>
+          <p:cNvPr id="166" name="TextBox 165">
+            <a:extLst>
+              <a:ext uri="{FF2B5EF4-FFF2-40B4-BE49-F238E27FC236}">
+                <a16:creationId xmlns:a16="http://schemas.microsoft.com/office/drawing/2014/main" id="{E8EF5B8A-CFD9-36F5-E8CC-A566CFA8B01C}"/>
+              </a:ext>
+            </a:extLst>
+          </p:cNvPr>
+          <p:cNvSpPr txBox="1"/>
+          <p:nvPr/>
+        </p:nvSpPr>
+        <p:spPr>
+          <a:xfrm>
+            <a:off x="9829375" y="4205084"/>
+            <a:ext cx="773596" cy="246221"/>
+          </a:xfrm>
+          <a:prstGeom prst="rect">
+            <a:avLst/>
+          </a:prstGeom>
+          <a:noFill/>
+        </p:spPr>
+        <p:txBody>
+          <a:bodyPr wrap="square" rtlCol="0">
+            <a:spAutoFit/>
+          </a:bodyPr>
+          <a:lstStyle/>
+          <a:p>
+            <a:r>
+              <a:rPr lang="en-GB" sz="1000" dirty="0"/>
+              <a:t>AEC6F8</a:t>
+            </a:r>
+          </a:p>
+        </p:txBody>
+      </p:sp>
+      <p:sp>
+        <p:nvSpPr>
+          <p:cNvPr id="167" name="TextBox 166">
+            <a:extLst>
+              <a:ext uri="{FF2B5EF4-FFF2-40B4-BE49-F238E27FC236}">
+                <a16:creationId xmlns:a16="http://schemas.microsoft.com/office/drawing/2014/main" id="{DC78B213-64B6-84F8-BA53-6918EC9085FF}"/>
+              </a:ext>
+            </a:extLst>
+          </p:cNvPr>
+          <p:cNvSpPr txBox="1"/>
+          <p:nvPr/>
+        </p:nvSpPr>
+        <p:spPr>
+          <a:xfrm>
+            <a:off x="6455915" y="5339265"/>
+            <a:ext cx="773596" cy="246221"/>
+          </a:xfrm>
+          <a:prstGeom prst="rect">
+            <a:avLst/>
+          </a:prstGeom>
+          <a:noFill/>
+        </p:spPr>
+        <p:txBody>
+          <a:bodyPr wrap="square" rtlCol="0">
+            <a:spAutoFit/>
+          </a:bodyPr>
+          <a:lstStyle/>
+          <a:p>
+            <a:r>
+              <a:rPr lang="en-GB" sz="1000" dirty="0"/>
+              <a:t>656370</a:t>
+            </a:r>
+          </a:p>
+        </p:txBody>
+      </p:sp>
+      <p:sp>
+        <p:nvSpPr>
+          <p:cNvPr id="168" name="TextBox 167">
+            <a:extLst>
+              <a:ext uri="{FF2B5EF4-FFF2-40B4-BE49-F238E27FC236}">
+                <a16:creationId xmlns:a16="http://schemas.microsoft.com/office/drawing/2014/main" id="{BE0DDA72-0BA5-3CBC-ECD6-D5BC1797D24F}"/>
+              </a:ext>
+            </a:extLst>
+          </p:cNvPr>
+          <p:cNvSpPr txBox="1"/>
+          <p:nvPr/>
+        </p:nvSpPr>
+        <p:spPr>
+          <a:xfrm>
+            <a:off x="6455915" y="5879228"/>
+            <a:ext cx="773596" cy="246221"/>
+          </a:xfrm>
+          <a:prstGeom prst="rect">
+            <a:avLst/>
+          </a:prstGeom>
+          <a:noFill/>
+        </p:spPr>
+        <p:txBody>
+          <a:bodyPr wrap="square" rtlCol="0">
+            <a:spAutoFit/>
+          </a:bodyPr>
+          <a:lstStyle/>
+          <a:p>
+            <a:r>
+              <a:rPr lang="en-GB" sz="1000" dirty="0"/>
+              <a:t>BBBBBD</a:t>
+            </a:r>
+          </a:p>
+        </p:txBody>
+      </p:sp>
+      <p:sp>
+        <p:nvSpPr>
+          <p:cNvPr id="169" name="TextBox 168">
+            <a:extLst>
+              <a:ext uri="{FF2B5EF4-FFF2-40B4-BE49-F238E27FC236}">
+                <a16:creationId xmlns:a16="http://schemas.microsoft.com/office/drawing/2014/main" id="{58F71B8F-EFAB-43AA-8FA9-6CCA585B89E9}"/>
+              </a:ext>
+            </a:extLst>
+          </p:cNvPr>
+          <p:cNvSpPr txBox="1"/>
+          <p:nvPr/>
+        </p:nvSpPr>
+        <p:spPr>
+          <a:xfrm>
+            <a:off x="6453775" y="6419191"/>
+            <a:ext cx="773596" cy="246221"/>
+          </a:xfrm>
+          <a:prstGeom prst="rect">
+            <a:avLst/>
+          </a:prstGeom>
+          <a:noFill/>
+        </p:spPr>
+        <p:txBody>
+          <a:bodyPr wrap="square" rtlCol="0">
+            <a:spAutoFit/>
+          </a:bodyPr>
+          <a:lstStyle/>
+          <a:p>
+            <a:r>
+              <a:rPr lang="en-GB" sz="1000" dirty="0"/>
+              <a:t>DCDCDE</a:t>
+            </a:r>
+          </a:p>
+        </p:txBody>
+      </p:sp>
+      <p:sp>
+        <p:nvSpPr>
+          <p:cNvPr id="170" name="Oval 169">
+            <a:extLst>
+              <a:ext uri="{FF2B5EF4-FFF2-40B4-BE49-F238E27FC236}">
+                <a16:creationId xmlns:a16="http://schemas.microsoft.com/office/drawing/2014/main" id="{E182CA5A-BAC1-2746-CED0-679EA9FACF9A}"/>
+              </a:ext>
+            </a:extLst>
+          </p:cNvPr>
+          <p:cNvSpPr/>
+          <p:nvPr/>
+        </p:nvSpPr>
+        <p:spPr>
+          <a:xfrm>
+            <a:off x="8823963" y="5263374"/>
+            <a:ext cx="398001" cy="398001"/>
+          </a:xfrm>
+          <a:prstGeom prst="ellipse">
+            <a:avLst/>
+          </a:prstGeom>
+          <a:solidFill>
+            <a:srgbClr val="4464AD"/>
+          </a:solidFill>
+          <a:ln>
+            <a:noFill/>
+          </a:ln>
+        </p:spPr>
+        <p:style>
+          <a:lnRef idx="2">
+            <a:schemeClr val="accent1">
+              <a:shade val="15000"/>
+            </a:schemeClr>
+          </a:lnRef>
+          <a:fillRef idx="1">
+            <a:schemeClr val="accent1"/>
+          </a:fillRef>
+          <a:effectRef idx="0">
+            <a:schemeClr val="accent1"/>
+          </a:effectRef>
+          <a:fontRef idx="minor">
+            <a:schemeClr val="lt1"/>
+          </a:fontRef>
+        </p:style>
+        <p:txBody>
+          <a:bodyPr rtlCol="0" anchor="ctr"/>
+          <a:lstStyle/>
+          <a:p>
+            <a:pPr algn="ctr"/>
+            <a:endParaRPr lang="en-GB"/>
+          </a:p>
+        </p:txBody>
+      </p:sp>
+      <p:sp>
+        <p:nvSpPr>
+          <p:cNvPr id="171" name="TextBox 170">
+            <a:extLst>
+              <a:ext uri="{FF2B5EF4-FFF2-40B4-BE49-F238E27FC236}">
+                <a16:creationId xmlns:a16="http://schemas.microsoft.com/office/drawing/2014/main" id="{2E8AE9C9-0A64-DA60-73A7-370853D5AECD}"/>
+              </a:ext>
+            </a:extLst>
+          </p:cNvPr>
+          <p:cNvSpPr txBox="1"/>
+          <p:nvPr/>
+        </p:nvSpPr>
+        <p:spPr>
+          <a:xfrm>
+            <a:off x="7845868" y="5299149"/>
+            <a:ext cx="1111643" cy="276999"/>
+          </a:xfrm>
+          <a:prstGeom prst="rect">
+            <a:avLst/>
+          </a:prstGeom>
+          <a:noFill/>
+        </p:spPr>
+        <p:txBody>
+          <a:bodyPr wrap="square" rtlCol="0">
+            <a:spAutoFit/>
+          </a:bodyPr>
+          <a:lstStyle/>
+          <a:p>
+            <a:r>
+              <a:rPr lang="en-GB" sz="1200" dirty="0"/>
+              <a:t>UX blue</a:t>
+            </a:r>
+          </a:p>
+        </p:txBody>
+      </p:sp>
+      <p:sp>
+        <p:nvSpPr>
+          <p:cNvPr id="172" name="Oval 171">
+            <a:extLst>
+              <a:ext uri="{FF2B5EF4-FFF2-40B4-BE49-F238E27FC236}">
+                <a16:creationId xmlns:a16="http://schemas.microsoft.com/office/drawing/2014/main" id="{8FDC283C-64D7-D7B2-FE99-B196D27C4539}"/>
+              </a:ext>
+            </a:extLst>
+          </p:cNvPr>
+          <p:cNvSpPr/>
+          <p:nvPr/>
+        </p:nvSpPr>
+        <p:spPr>
+          <a:xfrm>
+            <a:off x="8827536" y="5773998"/>
+            <a:ext cx="398001" cy="398001"/>
+          </a:xfrm>
+          <a:prstGeom prst="ellipse">
+            <a:avLst/>
+          </a:prstGeom>
+          <a:solidFill>
+            <a:srgbClr val="2A3E6E"/>
+          </a:solidFill>
+          <a:ln>
+            <a:noFill/>
+          </a:ln>
+        </p:spPr>
+        <p:style>
+          <a:lnRef idx="2">
+            <a:schemeClr val="accent1">
+              <a:shade val="15000"/>
+            </a:schemeClr>
+          </a:lnRef>
+          <a:fillRef idx="1">
+            <a:schemeClr val="accent1"/>
+          </a:fillRef>
+          <a:effectRef idx="0">
+            <a:schemeClr val="accent1"/>
+          </a:effectRef>
+          <a:fontRef idx="minor">
+            <a:schemeClr val="lt1"/>
+          </a:fontRef>
+        </p:style>
+        <p:txBody>
+          <a:bodyPr rtlCol="0" anchor="ctr"/>
+          <a:lstStyle/>
+          <a:p>
+            <a:pPr algn="ctr"/>
+            <a:endParaRPr lang="en-GB"/>
+          </a:p>
+        </p:txBody>
+      </p:sp>
+      <p:sp>
+        <p:nvSpPr>
+          <p:cNvPr id="173" name="TextBox 172">
+            <a:extLst>
+              <a:ext uri="{FF2B5EF4-FFF2-40B4-BE49-F238E27FC236}">
+                <a16:creationId xmlns:a16="http://schemas.microsoft.com/office/drawing/2014/main" id="{66C9EFEE-E833-FEE2-8DB1-313FED4622D5}"/>
+              </a:ext>
+            </a:extLst>
+          </p:cNvPr>
+          <p:cNvSpPr txBox="1"/>
+          <p:nvPr/>
+        </p:nvSpPr>
+        <p:spPr>
+          <a:xfrm>
+            <a:off x="7845867" y="5845561"/>
+            <a:ext cx="1111643" cy="276999"/>
+          </a:xfrm>
+          <a:prstGeom prst="rect">
+            <a:avLst/>
+          </a:prstGeom>
+          <a:noFill/>
+        </p:spPr>
+        <p:txBody>
+          <a:bodyPr wrap="square" rtlCol="0">
+            <a:spAutoFit/>
+          </a:bodyPr>
+          <a:lstStyle/>
+          <a:p>
+            <a:r>
+              <a:rPr lang="en-GB" sz="1200" dirty="0"/>
+              <a:t>UX blue dark</a:t>
+            </a:r>
+          </a:p>
+        </p:txBody>
+      </p:sp>
+      <p:sp>
+        <p:nvSpPr>
+          <p:cNvPr id="174" name="Oval 173">
+            <a:extLst>
+              <a:ext uri="{FF2B5EF4-FFF2-40B4-BE49-F238E27FC236}">
+                <a16:creationId xmlns:a16="http://schemas.microsoft.com/office/drawing/2014/main" id="{56F85BC7-7775-386C-6471-27EAE149B986}"/>
+              </a:ext>
+            </a:extLst>
+          </p:cNvPr>
+          <p:cNvSpPr/>
+          <p:nvPr/>
+        </p:nvSpPr>
+        <p:spPr>
+          <a:xfrm>
+            <a:off x="8823962" y="6331471"/>
+            <a:ext cx="398001" cy="398001"/>
+          </a:xfrm>
+          <a:prstGeom prst="ellipse">
+            <a:avLst/>
+          </a:prstGeom>
+          <a:solidFill>
+            <a:srgbClr val="618FFB"/>
+          </a:solidFill>
+          <a:ln>
+            <a:noFill/>
+          </a:ln>
+        </p:spPr>
+        <p:style>
+          <a:lnRef idx="2">
+            <a:schemeClr val="accent1">
+              <a:shade val="15000"/>
+            </a:schemeClr>
+          </a:lnRef>
+          <a:fillRef idx="1">
+            <a:schemeClr val="accent1"/>
+          </a:fillRef>
+          <a:effectRef idx="0">
+            <a:schemeClr val="accent1"/>
+          </a:effectRef>
+          <a:fontRef idx="minor">
+            <a:schemeClr val="lt1"/>
+          </a:fontRef>
+        </p:style>
+        <p:txBody>
+          <a:bodyPr rtlCol="0" anchor="ctr"/>
+          <a:lstStyle/>
+          <a:p>
+            <a:pPr algn="ctr"/>
+            <a:endParaRPr lang="en-GB"/>
+          </a:p>
+        </p:txBody>
+      </p:sp>
+      <p:sp>
+        <p:nvSpPr>
+          <p:cNvPr id="175" name="TextBox 174">
+            <a:extLst>
+              <a:ext uri="{FF2B5EF4-FFF2-40B4-BE49-F238E27FC236}">
+                <a16:creationId xmlns:a16="http://schemas.microsoft.com/office/drawing/2014/main" id="{7B85083A-56DC-AE85-E6ED-D42A85C024DE}"/>
+              </a:ext>
+            </a:extLst>
+          </p:cNvPr>
+          <p:cNvSpPr txBox="1"/>
+          <p:nvPr/>
+        </p:nvSpPr>
+        <p:spPr>
+          <a:xfrm>
+            <a:off x="7845867" y="6391973"/>
+            <a:ext cx="1111643" cy="276999"/>
+          </a:xfrm>
+          <a:prstGeom prst="rect">
+            <a:avLst/>
+          </a:prstGeom>
+          <a:noFill/>
+        </p:spPr>
+        <p:txBody>
+          <a:bodyPr wrap="square" rtlCol="0">
+            <a:spAutoFit/>
+          </a:bodyPr>
+          <a:lstStyle/>
+          <a:p>
+            <a:r>
+              <a:rPr lang="en-GB" sz="1200" dirty="0"/>
+              <a:t>UX blue light</a:t>
+            </a:r>
+          </a:p>
+        </p:txBody>
+      </p:sp>
+      <p:sp>
+        <p:nvSpPr>
+          <p:cNvPr id="176" name="TextBox 175">
+            <a:extLst>
+              <a:ext uri="{FF2B5EF4-FFF2-40B4-BE49-F238E27FC236}">
+                <a16:creationId xmlns:a16="http://schemas.microsoft.com/office/drawing/2014/main" id="{9B9BF547-3BBB-70D5-4D36-6F6090B586A9}"/>
+              </a:ext>
+            </a:extLst>
+          </p:cNvPr>
+          <p:cNvSpPr txBox="1"/>
+          <p:nvPr/>
+        </p:nvSpPr>
+        <p:spPr>
+          <a:xfrm>
+            <a:off x="9301424" y="5338391"/>
+            <a:ext cx="773596" cy="246221"/>
+          </a:xfrm>
+          <a:prstGeom prst="rect">
+            <a:avLst/>
+          </a:prstGeom>
+          <a:noFill/>
+        </p:spPr>
+        <p:txBody>
+          <a:bodyPr wrap="square" rtlCol="0">
+            <a:spAutoFit/>
+          </a:bodyPr>
+          <a:lstStyle/>
+          <a:p>
+            <a:r>
+              <a:rPr lang="en-GB" sz="1000" dirty="0"/>
+              <a:t>4464AD</a:t>
+            </a:r>
+          </a:p>
+        </p:txBody>
+      </p:sp>
+      <p:sp>
+        <p:nvSpPr>
+          <p:cNvPr id="177" name="TextBox 176">
+            <a:extLst>
+              <a:ext uri="{FF2B5EF4-FFF2-40B4-BE49-F238E27FC236}">
+                <a16:creationId xmlns:a16="http://schemas.microsoft.com/office/drawing/2014/main" id="{45D37AEE-A77C-5C10-371C-2367BB38F3FF}"/>
+              </a:ext>
+            </a:extLst>
+          </p:cNvPr>
+          <p:cNvSpPr txBox="1"/>
+          <p:nvPr/>
+        </p:nvSpPr>
+        <p:spPr>
+          <a:xfrm>
+            <a:off x="9301424" y="5878354"/>
+            <a:ext cx="773596" cy="246221"/>
+          </a:xfrm>
+          <a:prstGeom prst="rect">
+            <a:avLst/>
+          </a:prstGeom>
+          <a:noFill/>
+        </p:spPr>
+        <p:txBody>
+          <a:bodyPr wrap="square" rtlCol="0">
+            <a:spAutoFit/>
+          </a:bodyPr>
+          <a:lstStyle/>
+          <a:p>
+            <a:r>
+              <a:rPr lang="en-GB" sz="1000" dirty="0"/>
+              <a:t>2A3E6E</a:t>
+            </a:r>
+          </a:p>
+        </p:txBody>
+      </p:sp>
+      <p:sp>
+        <p:nvSpPr>
+          <p:cNvPr id="178" name="TextBox 177">
+            <a:extLst>
+              <a:ext uri="{FF2B5EF4-FFF2-40B4-BE49-F238E27FC236}">
+                <a16:creationId xmlns:a16="http://schemas.microsoft.com/office/drawing/2014/main" id="{A498FEE9-5690-73E4-C035-E753679A9C7D}"/>
+              </a:ext>
+            </a:extLst>
+          </p:cNvPr>
+          <p:cNvSpPr txBox="1"/>
+          <p:nvPr/>
+        </p:nvSpPr>
+        <p:spPr>
+          <a:xfrm>
+            <a:off x="9299284" y="6418317"/>
+            <a:ext cx="773596" cy="246221"/>
+          </a:xfrm>
+          <a:prstGeom prst="rect">
+            <a:avLst/>
+          </a:prstGeom>
+          <a:noFill/>
+        </p:spPr>
+        <p:txBody>
+          <a:bodyPr wrap="square" rtlCol="0">
+            <a:spAutoFit/>
+          </a:bodyPr>
+          <a:lstStyle/>
+          <a:p>
+            <a:r>
+              <a:rPr lang="en-GB" sz="1000" dirty="0"/>
+              <a:t>6B8EF3</a:t>
             </a:r>
           </a:p>
         </p:txBody>

</xml_diff>